<commit_message>
Small update on lecture 4
</commit_message>
<xml_diff>
--- a/Lectures/pptx/4_Lecture_four.pptx
+++ b/Lectures/pptx/4_Lecture_four.pptx
@@ -5141,12 +5141,6 @@
               </a:rPr>
               <a:t>Ian Bush</a:t>
             </a:r>
-            <a:endParaRPr lang="en-GB" sz="1600" dirty="0" smtClean="0">
-              <a:solidFill>
-                <a:srgbClr val="000000"/>
-              </a:solidFill>
-              <a:latin typeface="+mn-lt"/>
-            </a:endParaRPr>
           </a:p>
           <a:p>
             <a:pPr algn="ctr"/>
@@ -5477,11 +5471,6 @@
               </a:rPr>
               <a:t> </a:t>
             </a:r>
-            <a:endParaRPr lang="en-US" sz="2400" kern="0" dirty="0" smtClean="0">
-              <a:solidFill>
-                <a:srgbClr val="000000"/>
-              </a:solidFill>
-            </a:endParaRPr>
           </a:p>
         </p:txBody>
       </p:sp>
@@ -9739,14 +9728,34 @@
           <a:p>
             <a:pPr lvl="1"/>
             <a:r>
-              <a:rPr lang="en-GB" dirty="0" smtClean="0"/>
-              <a:t>We will briefly in the exercises</a:t>
-            </a:r>
-          </a:p>
-          <a:p>
-            <a:r>
-              <a:rPr lang="en-GB" dirty="0" smtClean="0"/>
-              <a:t>But remember if you get the wrong answer it doesn’t matter how fast it runs</a:t>
+              <a:rPr lang="en-GB" dirty="0" err="1"/>
+              <a:t>g</a:t>
+            </a:r>
+            <a:r>
+              <a:rPr lang="en-GB" smtClean="0"/>
+              <a:t>prof</a:t>
+            </a:r>
+            <a:r>
+              <a:rPr lang="en-GB" dirty="0" smtClean="0"/>
+              <a:t> is a simple free one, and you will look at </a:t>
+            </a:r>
+            <a:r>
+              <a:rPr lang="en-GB" dirty="0" err="1" smtClean="0"/>
+              <a:t>nvvp</a:t>
+            </a:r>
+            <a:r>
+              <a:rPr lang="en-GB" dirty="0" smtClean="0"/>
+              <a:t> in the CUDA exercises</a:t>
+            </a:r>
+          </a:p>
+          <a:p>
+            <a:r>
+              <a:rPr lang="en-GB" dirty="0" smtClean="0"/>
+              <a:t>But </a:t>
+            </a:r>
+            <a:r>
+              <a:rPr lang="en-GB" dirty="0" smtClean="0"/>
+              <a:t>remember if you get the wrong answer it doesn’t matter how fast it runs</a:t>
             </a:r>
           </a:p>
           <a:p>
@@ -13483,13 +13492,6 @@
               </a:rPr>
               <a:t>The existence of software licences</a:t>
             </a:r>
-            <a:endParaRPr lang="en-GB" sz="1400" dirty="0" smtClean="0">
-              <a:solidFill>
-                <a:srgbClr val="C2470C"/>
-              </a:solidFill>
-              <a:latin typeface="Arial" panose="020B0604020202020204"/>
-              <a:cs typeface="Courier New" panose="02070309020205020404" pitchFamily="49" charset="0"/>
-            </a:endParaRPr>
           </a:p>
           <a:p>
             <a:pPr marL="285750" indent="-285750">
@@ -14035,13 +14037,6 @@
               </a:rPr>
               <a:t>We shall look further into C!</a:t>
             </a:r>
-            <a:endParaRPr lang="en-GB" sz="1400" dirty="0" smtClean="0">
-              <a:solidFill>
-                <a:srgbClr val="C2470C"/>
-              </a:solidFill>
-              <a:latin typeface="Arial" panose="020B0604020202020204"/>
-              <a:cs typeface="Courier New" panose="02070309020205020404" pitchFamily="49" charset="0"/>
-            </a:endParaRPr>
           </a:p>
           <a:p>
             <a:endParaRPr lang="en-GB" sz="1400" dirty="0" smtClean="0">
@@ -15556,7 +15551,7 @@
         <a:effectLst/>
         <a:extLst>
           <a:ext uri="{AF507438-7753-43e0-B8FC-AC1667EBCBE1}">
-            <a14:hiddenEffects xmlns="" xmlns:a14="http://schemas.microsoft.com/office/drawing/2010/main">
+            <a14:hiddenEffects xmlns:a14="http://schemas.microsoft.com/office/drawing/2010/main" xmlns="">
               <a:effectLst>
                 <a:outerShdw blurRad="63500" dist="38099" dir="2700000" algn="ctr" rotWithShape="0">
                   <a:schemeClr val="bg2">
@@ -15632,7 +15627,7 @@
         <a:effectLst/>
         <a:extLst>
           <a:ext uri="{AF507438-7753-43e0-B8FC-AC1667EBCBE1}">
-            <a14:hiddenEffects xmlns="" xmlns:a14="http://schemas.microsoft.com/office/drawing/2010/main">
+            <a14:hiddenEffects xmlns:a14="http://schemas.microsoft.com/office/drawing/2010/main" xmlns="">
               <a:effectLst>
                 <a:outerShdw blurRad="63500" dist="38099" dir="2700000" algn="ctr" rotWithShape="0">
                   <a:schemeClr val="bg2">
@@ -16695,6 +16690,15 @@
 </file>
 
 <file path=customXml/item1.xml><?xml version="1.0" encoding="utf-8"?>
+<p:properties xmlns:p="http://schemas.microsoft.com/office/2006/metadata/properties" xmlns:xsi="http://www.w3.org/2001/XMLSchema-instance" xmlns:pc="http://schemas.microsoft.com/office/infopath/2007/PartnerControls">
+  <documentManagement>
+    <PublishingExpirationDate xmlns="http://schemas.microsoft.com/sharepoint/v3" xsi:nil="true"/>
+    <PublishingStartDate xmlns="http://schemas.microsoft.com/sharepoint/v3" xsi:nil="true"/>
+  </documentManagement>
+</p:properties>
+</file>
+
+<file path=customXml/item2.xml><?xml version="1.0" encoding="utf-8"?>
 <ct:contentTypeSchema xmlns:ct="http://schemas.microsoft.com/office/2006/metadata/contentType" xmlns:ma="http://schemas.microsoft.com/office/2006/metadata/properties/metaAttributes" ct:_="" ma:_="" ma:contentTypeName="Document" ma:contentTypeID="0x010100F087B862386F8A48840A2142C0600765" ma:contentTypeVersion="1" ma:contentTypeDescription="Create a new document." ma:contentTypeScope="" ma:versionID="68e7a6ad2ab34d836eda56dc5c7bc733">
   <xsd:schema xmlns:xsd="http://www.w3.org/2001/XMLSchema" xmlns:xs="http://www.w3.org/2001/XMLSchema" xmlns:p="http://schemas.microsoft.com/office/2006/metadata/properties" xmlns:ns1="http://schemas.microsoft.com/sharepoint/v3" targetNamespace="http://schemas.microsoft.com/office/2006/metadata/properties" ma:root="true" ma:fieldsID="48c5b5cd9b8d25ff6dd15848836f4270" ns1:_="">
     <xsd:import namespace="http://schemas.microsoft.com/sharepoint/v3"/>
@@ -16826,15 +16830,6 @@
 </ct:contentTypeSchema>
 </file>
 
-<file path=customXml/item2.xml><?xml version="1.0" encoding="utf-8"?>
-<p:properties xmlns:p="http://schemas.microsoft.com/office/2006/metadata/properties" xmlns:xsi="http://www.w3.org/2001/XMLSchema-instance" xmlns:pc="http://schemas.microsoft.com/office/infopath/2007/PartnerControls">
-  <documentManagement>
-    <PublishingExpirationDate xmlns="http://schemas.microsoft.com/sharepoint/v3" xsi:nil="true"/>
-    <PublishingStartDate xmlns="http://schemas.microsoft.com/sharepoint/v3" xsi:nil="true"/>
-  </documentManagement>
-</p:properties>
-</file>
-
 <file path=customXml/item3.xml><?xml version="1.0" encoding="utf-8"?>
 <?mso-contentType ?>
 <FormTemplates xmlns="http://schemas.microsoft.com/sharepoint/v3/contenttype/forms">
@@ -16845,6 +16840,22 @@
 </file>
 
 <file path=customXml/itemProps1.xml><?xml version="1.0" encoding="utf-8"?>
+<ds:datastoreItem xmlns:ds="http://schemas.openxmlformats.org/officeDocument/2006/customXml" ds:itemID="{D83787E9-855B-43BD-8382-B7C63B9BC33D}">
+  <ds:schemaRefs>
+    <ds:schemaRef ds:uri="http://purl.org/dc/elements/1.1/"/>
+    <ds:schemaRef ds:uri="http://schemas.microsoft.com/office/2006/metadata/properties"/>
+    <ds:schemaRef ds:uri="http://schemas.microsoft.com/sharepoint/v3"/>
+    <ds:schemaRef ds:uri="http://purl.org/dc/terms/"/>
+    <ds:schemaRef ds:uri="http://schemas.openxmlformats.org/package/2006/metadata/core-properties"/>
+    <ds:schemaRef ds:uri="http://schemas.microsoft.com/office/2006/documentManagement/types"/>
+    <ds:schemaRef ds:uri="http://schemas.microsoft.com/office/infopath/2007/PartnerControls"/>
+    <ds:schemaRef ds:uri="http://www.w3.org/XML/1998/namespace"/>
+    <ds:schemaRef ds:uri="http://purl.org/dc/dcmitype/"/>
+  </ds:schemaRefs>
+</ds:datastoreItem>
+</file>
+
+<file path=customXml/itemProps2.xml><?xml version="1.0" encoding="utf-8"?>
 <ds:datastoreItem xmlns:ds="http://schemas.openxmlformats.org/officeDocument/2006/customXml" ds:itemID="{866DD9C6-787C-4079-86E8-1446954686C6}">
   <ds:schemaRefs>
     <ds:schemaRef ds:uri="http://schemas.microsoft.com/office/2006/metadata/contentType"/>
@@ -16862,22 +16873,6 @@
 </ds:datastoreItem>
 </file>
 
-<file path=customXml/itemProps2.xml><?xml version="1.0" encoding="utf-8"?>
-<ds:datastoreItem xmlns:ds="http://schemas.openxmlformats.org/officeDocument/2006/customXml" ds:itemID="{D83787E9-855B-43BD-8382-B7C63B9BC33D}">
-  <ds:schemaRefs>
-    <ds:schemaRef ds:uri="http://purl.org/dc/elements/1.1/"/>
-    <ds:schemaRef ds:uri="http://schemas.microsoft.com/office/2006/metadata/properties"/>
-    <ds:schemaRef ds:uri="http://schemas.microsoft.com/sharepoint/v3"/>
-    <ds:schemaRef ds:uri="http://purl.org/dc/terms/"/>
-    <ds:schemaRef ds:uri="http://schemas.openxmlformats.org/package/2006/metadata/core-properties"/>
-    <ds:schemaRef ds:uri="http://schemas.microsoft.com/office/2006/documentManagement/types"/>
-    <ds:schemaRef ds:uri="http://schemas.microsoft.com/office/infopath/2007/PartnerControls"/>
-    <ds:schemaRef ds:uri="http://www.w3.org/XML/1998/namespace"/>
-    <ds:schemaRef ds:uri="http://purl.org/dc/dcmitype/"/>
-  </ds:schemaRefs>
-</ds:datastoreItem>
-</file>
-
 <file path=customXml/itemProps3.xml><?xml version="1.0" encoding="utf-8"?>
 <ds:datastoreItem xmlns:ds="http://schemas.openxmlformats.org/officeDocument/2006/customXml" ds:itemID="{2E0637EC-CEA5-409F-B139-003005A14145}">
   <ds:schemaRefs>

</xml_diff>